<commit_message>
amber new datapie chart
</commit_message>
<xml_diff>
--- a/The Eff {Strings} Project 1 Demo.pptx
+++ b/The Eff {Strings} Project 1 Demo.pptx
@@ -415,7 +415,7 @@
           <a:p>
             <a:fld id="{9184DA70-C731-4C70-880D-CCD4705E623C}" type="datetime1">
               <a:rPr lang="en-US" smtClean="0"/>
-              <a:t>5/6/2021</a:t>
+              <a:t>5/7/2021</a:t>
             </a:fld>
             <a:endParaRPr lang="en-US" dirty="0"/>
           </a:p>
@@ -603,7 +603,7 @@
           <a:p>
             <a:fld id="{B612A279-0833-481D-8C56-F67FD0AC6C50}" type="datetime1">
               <a:rPr lang="en-US" smtClean="0"/>
-              <a:t>5/6/2021</a:t>
+              <a:t>5/7/2021</a:t>
             </a:fld>
             <a:endParaRPr lang="en-US" dirty="0"/>
           </a:p>
@@ -845,7 +845,7 @@
           <a:p>
             <a:fld id="{6587DA83-5663-4C9C-B9AA-0B40A3DAFF81}" type="datetime1">
               <a:rPr lang="en-US" smtClean="0"/>
-              <a:t>5/6/2021</a:t>
+              <a:t>5/7/2021</a:t>
             </a:fld>
             <a:endParaRPr lang="en-US" dirty="0"/>
           </a:p>
@@ -1033,7 +1033,7 @@
           <a:p>
             <a:fld id="{4BE1D723-8F53-4F53-90B0-1982A396982E}" type="datetime1">
               <a:rPr lang="en-US" smtClean="0"/>
-              <a:t>5/6/2021</a:t>
+              <a:t>5/7/2021</a:t>
             </a:fld>
             <a:endParaRPr lang="en-US" dirty="0"/>
           </a:p>
@@ -1406,7 +1406,7 @@
           <a:p>
             <a:fld id="{97669AF7-7BEB-44E4-9852-375E34362B5B}" type="datetime1">
               <a:rPr lang="en-US" smtClean="0"/>
-              <a:t>5/6/2021</a:t>
+              <a:t>5/7/2021</a:t>
             </a:fld>
             <a:endParaRPr lang="en-US" dirty="0"/>
           </a:p>
@@ -1661,7 +1661,7 @@
           <a:p>
             <a:fld id="{BAAAC38D-0552-4C82-B593-E6124DFADBE2}" type="datetime1">
               <a:rPr lang="en-US" smtClean="0"/>
-              <a:t>5/6/2021</a:t>
+              <a:t>5/7/2021</a:t>
             </a:fld>
             <a:endParaRPr lang="en-US" dirty="0"/>
           </a:p>
@@ -2058,7 +2058,7 @@
           <a:p>
             <a:fld id="{D9DF0F1C-5577-4ACB-BB62-DF8F3C494C7E}" type="datetime1">
               <a:rPr lang="en-US" smtClean="0"/>
-              <a:t>5/6/2021</a:t>
+              <a:t>5/7/2021</a:t>
             </a:fld>
             <a:endParaRPr lang="en-US" dirty="0"/>
           </a:p>
@@ -2194,7 +2194,7 @@
           <a:p>
             <a:fld id="{1775B394-D9F9-4F0C-B15D-605F45CB9E9F}" type="datetime1">
               <a:rPr lang="en-US" smtClean="0"/>
-              <a:t>5/6/2021</a:t>
+              <a:t>5/7/2021</a:t>
             </a:fld>
             <a:endParaRPr lang="en-US" dirty="0"/>
           </a:p>
@@ -2351,7 +2351,7 @@
           <a:p>
             <a:fld id="{39667345-2558-425A-8533-9BFDBCE15005}" type="datetime1">
               <a:rPr lang="en-US" smtClean="0"/>
-              <a:t>5/6/2021</a:t>
+              <a:t>5/7/2021</a:t>
             </a:fld>
             <a:endParaRPr lang="en-US" dirty="0"/>
           </a:p>
@@ -2680,7 +2680,7 @@
           <a:p>
             <a:fld id="{92BEA474-078D-4E9B-9B14-09A87B19DC46}" type="datetime1">
               <a:rPr lang="en-US" smtClean="0"/>
-              <a:t>5/6/2021</a:t>
+              <a:t>5/7/2021</a:t>
             </a:fld>
             <a:endParaRPr lang="en-US" dirty="0"/>
           </a:p>
@@ -3030,7 +3030,7 @@
           <a:p>
             <a:fld id="{4907D986-8816-4272-A432-0437A28A9828}" type="datetime1">
               <a:rPr lang="en-US" smtClean="0"/>
-              <a:t>5/6/2021</a:t>
+              <a:t>5/7/2021</a:t>
             </a:fld>
             <a:endParaRPr lang="en-US" dirty="0"/>
           </a:p>
@@ -3291,7 +3291,7 @@
           <a:p>
             <a:fld id="{62D6E202-B606-4609-B914-27C9371A1F6D}" type="datetime1">
               <a:rPr lang="en-US" smtClean="0"/>
-              <a:t>5/6/2021</a:t>
+              <a:t>5/7/2021</a:t>
             </a:fld>
             <a:endParaRPr lang="en-US" dirty="0"/>
           </a:p>
@@ -6873,7 +6873,7 @@
 </file>
 
 <file path=ppt/slides/slide8.xml><?xml version="1.0" encoding="utf-8"?>
-<p:sld xmlns:a="http://schemas.openxmlformats.org/drawingml/2006/main" xmlns:r="http://schemas.openxmlformats.org/officeDocument/2006/relationships" xmlns:p="http://schemas.openxmlformats.org/presentationml/2006/main" show="0">
+<p:sld xmlns:a="http://schemas.openxmlformats.org/drawingml/2006/main" xmlns:r="http://schemas.openxmlformats.org/officeDocument/2006/relationships" xmlns:p="http://schemas.openxmlformats.org/presentationml/2006/main">
   <p:cSld>
     <p:bg>
       <p:bgPr>
@@ -7070,7 +7070,7 @@
         <p:spPr>
           <a:xfrm>
             <a:off x="504185" y="343306"/>
-            <a:ext cx="7738016" cy="373757"/>
+            <a:ext cx="2121093" cy="373757"/>
           </a:xfrm>
           <a:prstGeom prst="rect">
             <a:avLst/>
@@ -7101,23 +7101,7 @@
                 <a:ea typeface="Calibri" panose="020F0502020204030204" pitchFamily="34" charset="0"/>
                 <a:cs typeface="Times New Roman" panose="02020603050405020304" pitchFamily="18" charset="0"/>
               </a:rPr>
-              <a:t>Who are the most popular artists by </a:t>
-            </a:r>
-            <a:r>
-              <a:rPr lang="en-US" b="1" i="1" dirty="0">
-                <a:latin typeface="Arial" panose="020B0604020202020204" pitchFamily="34" charset="0"/>
-                <a:cs typeface="Times New Roman" panose="02020603050405020304" pitchFamily="18" charset="0"/>
-              </a:rPr>
-              <a:t>listeners per </a:t>
-            </a:r>
-            <a:r>
-              <a:rPr lang="en-US" sz="1800" b="1" i="1" dirty="0">
-                <a:effectLst/>
-                <a:latin typeface="Arial" panose="020B0604020202020204" pitchFamily="34" charset="0"/>
-                <a:ea typeface="Calibri" panose="020F0502020204030204" pitchFamily="34" charset="0"/>
-                <a:cs typeface="Times New Roman" panose="02020603050405020304" pitchFamily="18" charset="0"/>
-              </a:rPr>
-              <a:t>country?  Christian</a:t>
+              <a:t>Who are the most</a:t>
             </a:r>
             <a:endParaRPr lang="en-US" sz="1800" dirty="0">
               <a:effectLst/>
@@ -7128,62 +7112,78 @@
           </a:p>
         </p:txBody>
       </p:sp>
-      <p:sp>
-        <p:nvSpPr>
-          <p:cNvPr id="2" name="TextBox 1">
-            <a:extLst>
-              <a:ext uri="{FF2B5EF4-FFF2-40B4-BE49-F238E27FC236}">
-                <a16:creationId xmlns:a16="http://schemas.microsoft.com/office/drawing/2014/main" id="{95D2CFAF-5760-4B7F-B627-4093483C1396}"/>
-              </a:ext>
-            </a:extLst>
-          </p:cNvPr>
-          <p:cNvSpPr txBox="1"/>
+      <p:pic>
+        <p:nvPicPr>
+          <p:cNvPr id="5" name="Picture 4" descr="Chart&#10;&#10;Description automatically generated">
+            <a:extLst>
+              <a:ext uri="{FF2B5EF4-FFF2-40B4-BE49-F238E27FC236}">
+                <a16:creationId xmlns:a16="http://schemas.microsoft.com/office/drawing/2014/main" id="{0E02B161-B0E2-4866-84CE-544B27284A2C}"/>
+              </a:ext>
+            </a:extLst>
+          </p:cNvPr>
+          <p:cNvPicPr>
+            <a:picLocks noChangeAspect="1"/>
+          </p:cNvPicPr>
           <p:nvPr/>
-        </p:nvSpPr>
-        <p:spPr>
-          <a:xfrm>
-            <a:off x="6602083" y="989162"/>
-            <a:ext cx="5112589" cy="2862322"/>
+        </p:nvPicPr>
+        <p:blipFill>
+          <a:blip r:embed="rId2">
+            <a:extLst>
+              <a:ext uri="{28A0092B-C50C-407E-A947-70E740481C1C}">
+                <a14:useLocalDpi xmlns:a14="http://schemas.microsoft.com/office/drawing/2010/main" val="0"/>
+              </a:ext>
+            </a:extLst>
+          </a:blip>
+          <a:stretch>
+            <a:fillRect/>
+          </a:stretch>
+        </p:blipFill>
+        <p:spPr>
+          <a:xfrm>
+            <a:off x="610269" y="801047"/>
+            <a:ext cx="5485714" cy="3657143"/>
           </a:xfrm>
           <a:prstGeom prst="rect">
             <a:avLst/>
           </a:prstGeom>
-          <a:noFill/>
-        </p:spPr>
-        <p:txBody>
-          <a:bodyPr wrap="square" rtlCol="0">
-            <a:spAutoFit/>
-          </a:bodyPr>
-          <a:lstStyle/>
-          <a:p>
-            <a:r>
-              <a:rPr lang="en-US" dirty="0"/>
-              <a:t>Artists with the most listeners (or users) per country are: </a:t>
-            </a:r>
-          </a:p>
-          <a:p>
-            <a:endParaRPr lang="en-US" dirty="0"/>
-          </a:p>
-          <a:p>
-            <a:endParaRPr lang="en-US" dirty="0"/>
-          </a:p>
-          <a:p>
-            <a:endParaRPr lang="en-US" dirty="0"/>
-          </a:p>
-          <a:p>
-            <a:endParaRPr lang="en-US" dirty="0"/>
-          </a:p>
-          <a:p>
-            <a:endParaRPr lang="en-US" dirty="0"/>
-          </a:p>
-          <a:p>
-            <a:r>
-              <a:rPr lang="en-US" dirty="0"/>
-              <a:t>This correlates directly to the hypothesis that countries with higher or lower GDP will reflect more or less use of the app.</a:t>
-            </a:r>
-          </a:p>
-        </p:txBody>
-      </p:sp>
+        </p:spPr>
+      </p:pic>
+      <p:pic>
+        <p:nvPicPr>
+          <p:cNvPr id="8" name="Picture 7" descr="Chart, bar chart&#10;&#10;Description automatically generated">
+            <a:extLst>
+              <a:ext uri="{FF2B5EF4-FFF2-40B4-BE49-F238E27FC236}">
+                <a16:creationId xmlns:a16="http://schemas.microsoft.com/office/drawing/2014/main" id="{FC4E77AF-72DA-478B-9F62-1E8040D042A2}"/>
+              </a:ext>
+            </a:extLst>
+          </p:cNvPr>
+          <p:cNvPicPr>
+            <a:picLocks noChangeAspect="1"/>
+          </p:cNvPicPr>
+          <p:nvPr/>
+        </p:nvPicPr>
+        <p:blipFill>
+          <a:blip r:embed="rId3">
+            <a:extLst>
+              <a:ext uri="{28A0092B-C50C-407E-A947-70E740481C1C}">
+                <a14:useLocalDpi xmlns:a14="http://schemas.microsoft.com/office/drawing/2010/main" val="0"/>
+              </a:ext>
+            </a:extLst>
+          </a:blip>
+          <a:stretch>
+            <a:fillRect/>
+          </a:stretch>
+        </p:blipFill>
+        <p:spPr>
+          <a:xfrm>
+            <a:off x="5989966" y="1230702"/>
+            <a:ext cx="5948991" cy="2789566"/>
+          </a:xfrm>
+          <a:prstGeom prst="rect">
+            <a:avLst/>
+          </a:prstGeom>
+        </p:spPr>
+      </p:pic>
     </p:spTree>
     <p:extLst>
       <p:ext uri="{BB962C8B-B14F-4D97-AF65-F5344CB8AC3E}">
@@ -7395,7 +7395,7 @@
         <p:spPr>
           <a:xfrm>
             <a:off x="504185" y="343306"/>
-            <a:ext cx="6340197" cy="373757"/>
+            <a:ext cx="5416868" cy="373757"/>
           </a:xfrm>
           <a:prstGeom prst="rect">
             <a:avLst/>
@@ -7425,7 +7425,7 @@
                 <a:latin typeface="Arial" panose="020B0604020202020204" pitchFamily="34" charset="0"/>
                 <a:ea typeface="Calibri" panose="020F0502020204030204" pitchFamily="34" charset="0"/>
               </a:rPr>
-              <a:t>Which 5 artists are played most often globally? Ishmael </a:t>
+              <a:t>Which 5 artists are played most often globally? </a:t>
             </a:r>
             <a:endParaRPr lang="en-US" sz="1800" dirty="0">
               <a:effectLst/>

</xml_diff>